<commit_message>
dernière partie du l'écriture du memoire
</commit_message>
<xml_diff>
--- a/Chapitres/presentationMemoire.pptx
+++ b/Chapitres/presentationMemoire.pptx
@@ -4045,8 +4045,8 @@
         </p:nvSpPr>
         <p:spPr>
           <a:xfrm>
-            <a:off x="957469" y="1307064"/>
-            <a:ext cx="10515600" cy="4243872"/>
+            <a:off x="838200" y="1333568"/>
+            <a:ext cx="10515600" cy="4033562"/>
           </a:xfrm>
         </p:spPr>
         <p:txBody>
@@ -4063,49 +4063,47 @@
                 <a:latin typeface="Times New Roman" panose="02020603050405020304" pitchFamily="18" charset="0"/>
                 <a:cs typeface="Times New Roman" panose="02020603050405020304" pitchFamily="18" charset="0"/>
               </a:rPr>
-              <a:t>La communication asynchrone existe depuis longtemps et sont adopté dans plusieurs architectures de communication surtout dans les IoT. Mettre en une spécification pour uniformiser les APIs asynchrones pour interfacer les différentes applications sans se soucié de leur caractéristiques serait la bienvenue. Bien que, sur le web, il existe plusieurs spécifications asynchrones et qu’aucune n’a encore été adopté. Nous pouvons nous fiés à la même </a:t>
-            </a:r>
-            <a:r>
-              <a:rPr lang="fr-ML" sz="2400">
-                <a:latin typeface="Times New Roman" panose="02020603050405020304" pitchFamily="18" charset="0"/>
-                <a:cs typeface="Times New Roman" panose="02020603050405020304" pitchFamily="18" charset="0"/>
-              </a:rPr>
-              <a:t>histoire que pour </a:t>
+              <a:t>La communication asynchrone existe depuis longtemps et sont adoptés dans plusieurs architectures de communication surtout dans les IoT. Elle est différentes de celle de synchrone aux niveaux du couplage, de protocole, de l’évolutivité, l’absence de standard, des </a:t>
+            </a:r>
+            <a:r>
+              <a:rPr lang="fr-ML" sz="2400" b="1" dirty="0">
+                <a:latin typeface="Times New Roman" panose="02020603050405020304" pitchFamily="18" charset="0"/>
+                <a:cs typeface="Times New Roman" panose="02020603050405020304" pitchFamily="18" charset="0"/>
+              </a:rPr>
+              <a:t>MOM</a:t>
             </a:r>
             <a:r>
               <a:rPr lang="fr-ML" sz="2400" dirty="0">
                 <a:latin typeface="Times New Roman" panose="02020603050405020304" pitchFamily="18" charset="0"/>
                 <a:cs typeface="Times New Roman" panose="02020603050405020304" pitchFamily="18" charset="0"/>
               </a:rPr>
-              <a:t>la spécifications des APIs synchrones. Car SOAP (Simple Object Access Protocol) était le format imbattable et les développeurs ont passés beaucoup de temps à développer les services SOAP dans les entreprises. En 2015, REST le remplace comme nouveau standard. Aujourd’hui nous sommes de retour dans une nouvelle bataille juste pour la communication synchrone car : </a:t>
+              <a:t> (Message-</a:t>
             </a:r>
             <a:r>
               <a:rPr lang="fr-ML" sz="2400" dirty="0" err="1">
                 <a:latin typeface="Times New Roman" panose="02020603050405020304" pitchFamily="18" charset="0"/>
                 <a:cs typeface="Times New Roman" panose="02020603050405020304" pitchFamily="18" charset="0"/>
               </a:rPr>
-              <a:t>gRPC</a:t>
+              <a:t>Oriented</a:t>
             </a:r>
             <a:r>
               <a:rPr lang="fr-ML" sz="2400" dirty="0">
                 <a:latin typeface="Times New Roman" panose="02020603050405020304" pitchFamily="18" charset="0"/>
                 <a:cs typeface="Times New Roman" panose="02020603050405020304" pitchFamily="18" charset="0"/>
               </a:rPr>
-              <a:t>, </a:t>
-            </a:r>
-            <a:r>
-              <a:rPr lang="fr-ML" sz="2400" dirty="0" err="1">
-                <a:latin typeface="Times New Roman" panose="02020603050405020304" pitchFamily="18" charset="0"/>
-                <a:cs typeface="Times New Roman" panose="02020603050405020304" pitchFamily="18" charset="0"/>
-              </a:rPr>
-              <a:t>GraphQL</a:t>
-            </a:r>
+              <a:t> Middleware) et surtout de gestion d’erreur quant on parle des APIs.</a:t>
+            </a:r>
+          </a:p>
+          <a:p>
+            <a:pPr marL="0" indent="0">
+              <a:buNone/>
+            </a:pPr>
             <a:r>
               <a:rPr lang="fr-ML" sz="2400" dirty="0">
                 <a:latin typeface="Times New Roman" panose="02020603050405020304" pitchFamily="18" charset="0"/>
                 <a:cs typeface="Times New Roman" panose="02020603050405020304" pitchFamily="18" charset="0"/>
               </a:rPr>
-              <a:t>, sont là pour tout conquérir à nouveau. </a:t>
+              <a:t>Ainsi, nous dévons retenir que les APIs HTTP ou APIs pub/sub n’est qu’une question de communication synchrone ou asynchrone. Mais le plus important est que nous ne devons jamais oublier les consommateurs des ces APIs. Ce qui implique une spécification léger, adapté et qui peut être amélioré au fur et à mesure l’avancer technologique et d’ajout des contrainte.</a:t>
             </a:r>
           </a:p>
         </p:txBody>

</xml_diff>